<commit_message>
added new screen shots for the ppt
</commit_message>
<xml_diff>
--- a/AWS Step Functions for Microservice Orchestration.pptx
+++ b/AWS Step Functions for Microservice Orchestration.pptx
@@ -22,16 +22,20 @@
     <p:sldId id="267" r:id="rId17"/>
     <p:sldId id="268" r:id="rId18"/>
     <p:sldId id="269" r:id="rId19"/>
+    <p:sldId id="270" r:id="rId20"/>
+    <p:sldId id="271" r:id="rId21"/>
+    <p:sldId id="272" r:id="rId22"/>
+    <p:sldId id="273" r:id="rId23"/>
   </p:sldIdLst>
   <p:sldSz cy="5143500" cx="9144000"/>
   <p:notesSz cx="6858000" cy="9144000"/>
   <p:embeddedFontLst>
     <p:embeddedFont>
       <p:font typeface="Roboto Mono"/>
-      <p:regular r:id="rId20"/>
-      <p:bold r:id="rId21"/>
-      <p:italic r:id="rId22"/>
-      <p:boldItalic r:id="rId23"/>
+      <p:regular r:id="rId24"/>
+      <p:bold r:id="rId25"/>
+      <p:italic r:id="rId26"/>
+      <p:boldItalic r:id="rId27"/>
     </p:embeddedFont>
   </p:embeddedFontLst>
   <p:defaultTextStyle>
@@ -1258,6 +1262,402 @@
       <p:sp>
         <p:nvSpPr>
           <p:cNvPr id="131" name="Google Shape;131;g31b4d7e15df_0_77:notes"/>
+          <p:cNvSpPr txBox="1"/>
+          <p:nvPr>
+            <p:ph idx="1" type="body"/>
+          </p:nvPr>
+        </p:nvSpPr>
+        <p:spPr>
+          <a:xfrm>
+            <a:off x="685800" y="4343400"/>
+            <a:ext cx="5486400" cy="4114800"/>
+          </a:xfrm>
+          <a:prstGeom prst="rect">
+            <a:avLst/>
+          </a:prstGeom>
+        </p:spPr>
+        <p:txBody>
+          <a:bodyPr anchorCtr="0" anchor="t" bIns="91425" lIns="91425" spcFirstLastPara="1" rIns="91425" wrap="square" tIns="91425">
+            <a:noAutofit/>
+          </a:bodyPr>
+          <a:lstStyle/>
+          <a:p>
+            <a:pPr indent="0" lvl="0" marL="0" rtl="0" algn="l">
+              <a:spcBef>
+                <a:spcPts val="0"/>
+              </a:spcBef>
+              <a:spcAft>
+                <a:spcPts val="0"/>
+              </a:spcAft>
+              <a:buNone/>
+            </a:pPr>
+            <a:r>
+              <a:t/>
+            </a:r>
+            <a:endParaRPr/>
+          </a:p>
+        </p:txBody>
+      </p:sp>
+    </p:spTree>
+  </p:cSld>
+  <p:clrMapOvr>
+    <a:masterClrMapping/>
+  </p:clrMapOvr>
+</p:notes>
+</file>
+
+<file path=ppt/notesSlides/notesSlide15.xml><?xml version="1.0" encoding="utf-8"?>
+<p:notes xmlns:a="http://schemas.openxmlformats.org/drawingml/2006/main" xmlns:r="http://schemas.openxmlformats.org/officeDocument/2006/relationships" xmlns:mc="http://schemas.openxmlformats.org/markup-compatibility/2006" xmlns:mv="urn:schemas-microsoft-com:mac:vml" xmlns:p="http://schemas.openxmlformats.org/presentationml/2006/main" xmlns:c="http://schemas.openxmlformats.org/drawingml/2006/chart" xmlns:dgm="http://schemas.openxmlformats.org/drawingml/2006/diagram" xmlns:o="urn:schemas-microsoft-com:office:office" xmlns:v="urn:schemas-microsoft-com:vml" xmlns:pvml="urn:schemas-microsoft-com:office:powerpoint" xmlns:com="http://schemas.openxmlformats.org/drawingml/2006/compatibility" xmlns:p14="http://schemas.microsoft.com/office/powerpoint/2010/main" xmlns:p15="http://schemas.microsoft.com/office/powerpoint/2012/main" xmlns:ahyp="http://schemas.microsoft.com/office/drawing/2018/hyperlinkcolor" showMasterPhAnim="0" showMasterSp="0">
+  <p:cSld>
+    <p:spTree>
+      <p:nvGrpSpPr>
+        <p:cNvPr id="135" name="Shape 135"/>
+        <p:cNvGrpSpPr/>
+        <p:nvPr/>
+      </p:nvGrpSpPr>
+      <p:grpSpPr>
+        <a:xfrm>
+          <a:off x="0" y="0"/>
+          <a:ext cx="0" cy="0"/>
+          <a:chOff x="0" y="0"/>
+          <a:chExt cx="0" cy="0"/>
+        </a:xfrm>
+      </p:grpSpPr>
+      <p:sp>
+        <p:nvSpPr>
+          <p:cNvPr id="136" name="Google Shape;136;g31ba41c4295_1_0:notes"/>
+          <p:cNvSpPr/>
+          <p:nvPr>
+            <p:ph idx="2" type="sldImg"/>
+          </p:nvPr>
+        </p:nvSpPr>
+        <p:spPr>
+          <a:xfrm>
+            <a:off x="381300" y="685800"/>
+            <a:ext cx="6096000" cy="3429000"/>
+          </a:xfrm>
+          <a:custGeom>
+            <a:rect b="b" l="l" r="r" t="t"/>
+            <a:pathLst>
+              <a:path extrusionOk="0" h="120000" w="120000">
+                <a:moveTo>
+                  <a:pt x="0" y="0"/>
+                </a:moveTo>
+                <a:lnTo>
+                  <a:pt x="120000" y="0"/>
+                </a:lnTo>
+                <a:lnTo>
+                  <a:pt x="120000" y="120000"/>
+                </a:lnTo>
+                <a:lnTo>
+                  <a:pt x="0" y="120000"/>
+                </a:lnTo>
+                <a:close/>
+              </a:path>
+            </a:pathLst>
+          </a:custGeom>
+        </p:spPr>
+      </p:sp>
+      <p:sp>
+        <p:nvSpPr>
+          <p:cNvPr id="137" name="Google Shape;137;g31ba41c4295_1_0:notes"/>
+          <p:cNvSpPr txBox="1"/>
+          <p:nvPr>
+            <p:ph idx="1" type="body"/>
+          </p:nvPr>
+        </p:nvSpPr>
+        <p:spPr>
+          <a:xfrm>
+            <a:off x="685800" y="4343400"/>
+            <a:ext cx="5486400" cy="4114800"/>
+          </a:xfrm>
+          <a:prstGeom prst="rect">
+            <a:avLst/>
+          </a:prstGeom>
+        </p:spPr>
+        <p:txBody>
+          <a:bodyPr anchorCtr="0" anchor="t" bIns="91425" lIns="91425" spcFirstLastPara="1" rIns="91425" wrap="square" tIns="91425">
+            <a:noAutofit/>
+          </a:bodyPr>
+          <a:lstStyle/>
+          <a:p>
+            <a:pPr indent="0" lvl="0" marL="0" rtl="0" algn="l">
+              <a:spcBef>
+                <a:spcPts val="0"/>
+              </a:spcBef>
+              <a:spcAft>
+                <a:spcPts val="0"/>
+              </a:spcAft>
+              <a:buNone/>
+            </a:pPr>
+            <a:r>
+              <a:t/>
+            </a:r>
+            <a:endParaRPr/>
+          </a:p>
+        </p:txBody>
+      </p:sp>
+    </p:spTree>
+  </p:cSld>
+  <p:clrMapOvr>
+    <a:masterClrMapping/>
+  </p:clrMapOvr>
+</p:notes>
+</file>
+
+<file path=ppt/notesSlides/notesSlide16.xml><?xml version="1.0" encoding="utf-8"?>
+<p:notes xmlns:a="http://schemas.openxmlformats.org/drawingml/2006/main" xmlns:r="http://schemas.openxmlformats.org/officeDocument/2006/relationships" xmlns:mc="http://schemas.openxmlformats.org/markup-compatibility/2006" xmlns:mv="urn:schemas-microsoft-com:mac:vml" xmlns:p="http://schemas.openxmlformats.org/presentationml/2006/main" xmlns:c="http://schemas.openxmlformats.org/drawingml/2006/chart" xmlns:dgm="http://schemas.openxmlformats.org/drawingml/2006/diagram" xmlns:o="urn:schemas-microsoft-com:office:office" xmlns:v="urn:schemas-microsoft-com:vml" xmlns:pvml="urn:schemas-microsoft-com:office:powerpoint" xmlns:com="http://schemas.openxmlformats.org/drawingml/2006/compatibility" xmlns:p14="http://schemas.microsoft.com/office/powerpoint/2010/main" xmlns:p15="http://schemas.microsoft.com/office/powerpoint/2012/main" xmlns:ahyp="http://schemas.microsoft.com/office/drawing/2018/hyperlinkcolor" showMasterPhAnim="0" showMasterSp="0">
+  <p:cSld>
+    <p:spTree>
+      <p:nvGrpSpPr>
+        <p:cNvPr id="140" name="Shape 140"/>
+        <p:cNvGrpSpPr/>
+        <p:nvPr/>
+      </p:nvGrpSpPr>
+      <p:grpSpPr>
+        <a:xfrm>
+          <a:off x="0" y="0"/>
+          <a:ext cx="0" cy="0"/>
+          <a:chOff x="0" y="0"/>
+          <a:chExt cx="0" cy="0"/>
+        </a:xfrm>
+      </p:grpSpPr>
+      <p:sp>
+        <p:nvSpPr>
+          <p:cNvPr id="141" name="Google Shape;141;g31ba41c4295_1_6:notes"/>
+          <p:cNvSpPr/>
+          <p:nvPr>
+            <p:ph idx="2" type="sldImg"/>
+          </p:nvPr>
+        </p:nvSpPr>
+        <p:spPr>
+          <a:xfrm>
+            <a:off x="381300" y="685800"/>
+            <a:ext cx="6096000" cy="3429000"/>
+          </a:xfrm>
+          <a:custGeom>
+            <a:rect b="b" l="l" r="r" t="t"/>
+            <a:pathLst>
+              <a:path extrusionOk="0" h="120000" w="120000">
+                <a:moveTo>
+                  <a:pt x="0" y="0"/>
+                </a:moveTo>
+                <a:lnTo>
+                  <a:pt x="120000" y="0"/>
+                </a:lnTo>
+                <a:lnTo>
+                  <a:pt x="120000" y="120000"/>
+                </a:lnTo>
+                <a:lnTo>
+                  <a:pt x="0" y="120000"/>
+                </a:lnTo>
+                <a:close/>
+              </a:path>
+            </a:pathLst>
+          </a:custGeom>
+        </p:spPr>
+      </p:sp>
+      <p:sp>
+        <p:nvSpPr>
+          <p:cNvPr id="142" name="Google Shape;142;g31ba41c4295_1_6:notes"/>
+          <p:cNvSpPr txBox="1"/>
+          <p:nvPr>
+            <p:ph idx="1" type="body"/>
+          </p:nvPr>
+        </p:nvSpPr>
+        <p:spPr>
+          <a:xfrm>
+            <a:off x="685800" y="4343400"/>
+            <a:ext cx="5486400" cy="4114800"/>
+          </a:xfrm>
+          <a:prstGeom prst="rect">
+            <a:avLst/>
+          </a:prstGeom>
+        </p:spPr>
+        <p:txBody>
+          <a:bodyPr anchorCtr="0" anchor="t" bIns="91425" lIns="91425" spcFirstLastPara="1" rIns="91425" wrap="square" tIns="91425">
+            <a:noAutofit/>
+          </a:bodyPr>
+          <a:lstStyle/>
+          <a:p>
+            <a:pPr indent="0" lvl="0" marL="0" rtl="0" algn="l">
+              <a:spcBef>
+                <a:spcPts val="0"/>
+              </a:spcBef>
+              <a:spcAft>
+                <a:spcPts val="0"/>
+              </a:spcAft>
+              <a:buNone/>
+            </a:pPr>
+            <a:r>
+              <a:t/>
+            </a:r>
+            <a:endParaRPr/>
+          </a:p>
+        </p:txBody>
+      </p:sp>
+    </p:spTree>
+  </p:cSld>
+  <p:clrMapOvr>
+    <a:masterClrMapping/>
+  </p:clrMapOvr>
+</p:notes>
+</file>
+
+<file path=ppt/notesSlides/notesSlide17.xml><?xml version="1.0" encoding="utf-8"?>
+<p:notes xmlns:a="http://schemas.openxmlformats.org/drawingml/2006/main" xmlns:r="http://schemas.openxmlformats.org/officeDocument/2006/relationships" xmlns:mc="http://schemas.openxmlformats.org/markup-compatibility/2006" xmlns:mv="urn:schemas-microsoft-com:mac:vml" xmlns:p="http://schemas.openxmlformats.org/presentationml/2006/main" xmlns:c="http://schemas.openxmlformats.org/drawingml/2006/chart" xmlns:dgm="http://schemas.openxmlformats.org/drawingml/2006/diagram" xmlns:o="urn:schemas-microsoft-com:office:office" xmlns:v="urn:schemas-microsoft-com:vml" xmlns:pvml="urn:schemas-microsoft-com:office:powerpoint" xmlns:com="http://schemas.openxmlformats.org/drawingml/2006/compatibility" xmlns:p14="http://schemas.microsoft.com/office/powerpoint/2010/main" xmlns:p15="http://schemas.microsoft.com/office/powerpoint/2012/main" xmlns:ahyp="http://schemas.microsoft.com/office/drawing/2018/hyperlinkcolor" showMasterPhAnim="0" showMasterSp="0">
+  <p:cSld>
+    <p:spTree>
+      <p:nvGrpSpPr>
+        <p:cNvPr id="145" name="Shape 145"/>
+        <p:cNvGrpSpPr/>
+        <p:nvPr/>
+      </p:nvGrpSpPr>
+      <p:grpSpPr>
+        <a:xfrm>
+          <a:off x="0" y="0"/>
+          <a:ext cx="0" cy="0"/>
+          <a:chOff x="0" y="0"/>
+          <a:chExt cx="0" cy="0"/>
+        </a:xfrm>
+      </p:grpSpPr>
+      <p:sp>
+        <p:nvSpPr>
+          <p:cNvPr id="146" name="Google Shape;146;g31ba41c4295_1_10:notes"/>
+          <p:cNvSpPr/>
+          <p:nvPr>
+            <p:ph idx="2" type="sldImg"/>
+          </p:nvPr>
+        </p:nvSpPr>
+        <p:spPr>
+          <a:xfrm>
+            <a:off x="381300" y="685800"/>
+            <a:ext cx="6096000" cy="3429000"/>
+          </a:xfrm>
+          <a:custGeom>
+            <a:rect b="b" l="l" r="r" t="t"/>
+            <a:pathLst>
+              <a:path extrusionOk="0" h="120000" w="120000">
+                <a:moveTo>
+                  <a:pt x="0" y="0"/>
+                </a:moveTo>
+                <a:lnTo>
+                  <a:pt x="120000" y="0"/>
+                </a:lnTo>
+                <a:lnTo>
+                  <a:pt x="120000" y="120000"/>
+                </a:lnTo>
+                <a:lnTo>
+                  <a:pt x="0" y="120000"/>
+                </a:lnTo>
+                <a:close/>
+              </a:path>
+            </a:pathLst>
+          </a:custGeom>
+        </p:spPr>
+      </p:sp>
+      <p:sp>
+        <p:nvSpPr>
+          <p:cNvPr id="147" name="Google Shape;147;g31ba41c4295_1_10:notes"/>
+          <p:cNvSpPr txBox="1"/>
+          <p:nvPr>
+            <p:ph idx="1" type="body"/>
+          </p:nvPr>
+        </p:nvSpPr>
+        <p:spPr>
+          <a:xfrm>
+            <a:off x="685800" y="4343400"/>
+            <a:ext cx="5486400" cy="4114800"/>
+          </a:xfrm>
+          <a:prstGeom prst="rect">
+            <a:avLst/>
+          </a:prstGeom>
+        </p:spPr>
+        <p:txBody>
+          <a:bodyPr anchorCtr="0" anchor="t" bIns="91425" lIns="91425" spcFirstLastPara="1" rIns="91425" wrap="square" tIns="91425">
+            <a:noAutofit/>
+          </a:bodyPr>
+          <a:lstStyle/>
+          <a:p>
+            <a:pPr indent="0" lvl="0" marL="0" rtl="0" algn="l">
+              <a:spcBef>
+                <a:spcPts val="0"/>
+              </a:spcBef>
+              <a:spcAft>
+                <a:spcPts val="0"/>
+              </a:spcAft>
+              <a:buNone/>
+            </a:pPr>
+            <a:r>
+              <a:t/>
+            </a:r>
+            <a:endParaRPr/>
+          </a:p>
+        </p:txBody>
+      </p:sp>
+    </p:spTree>
+  </p:cSld>
+  <p:clrMapOvr>
+    <a:masterClrMapping/>
+  </p:clrMapOvr>
+</p:notes>
+</file>
+
+<file path=ppt/notesSlides/notesSlide18.xml><?xml version="1.0" encoding="utf-8"?>
+<p:notes xmlns:a="http://schemas.openxmlformats.org/drawingml/2006/main" xmlns:r="http://schemas.openxmlformats.org/officeDocument/2006/relationships" xmlns:mc="http://schemas.openxmlformats.org/markup-compatibility/2006" xmlns:mv="urn:schemas-microsoft-com:mac:vml" xmlns:p="http://schemas.openxmlformats.org/presentationml/2006/main" xmlns:c="http://schemas.openxmlformats.org/drawingml/2006/chart" xmlns:dgm="http://schemas.openxmlformats.org/drawingml/2006/diagram" xmlns:o="urn:schemas-microsoft-com:office:office" xmlns:v="urn:schemas-microsoft-com:vml" xmlns:pvml="urn:schemas-microsoft-com:office:powerpoint" xmlns:com="http://schemas.openxmlformats.org/drawingml/2006/compatibility" xmlns:p14="http://schemas.microsoft.com/office/powerpoint/2010/main" xmlns:p15="http://schemas.microsoft.com/office/powerpoint/2012/main" xmlns:ahyp="http://schemas.microsoft.com/office/drawing/2018/hyperlinkcolor" showMasterPhAnim="0" showMasterSp="0">
+  <p:cSld>
+    <p:spTree>
+      <p:nvGrpSpPr>
+        <p:cNvPr id="150" name="Shape 150"/>
+        <p:cNvGrpSpPr/>
+        <p:nvPr/>
+      </p:nvGrpSpPr>
+      <p:grpSpPr>
+        <a:xfrm>
+          <a:off x="0" y="0"/>
+          <a:ext cx="0" cy="0"/>
+          <a:chOff x="0" y="0"/>
+          <a:chExt cx="0" cy="0"/>
+        </a:xfrm>
+      </p:grpSpPr>
+      <p:sp>
+        <p:nvSpPr>
+          <p:cNvPr id="151" name="Google Shape;151;g31ba41c4295_1_14:notes"/>
+          <p:cNvSpPr/>
+          <p:nvPr>
+            <p:ph idx="2" type="sldImg"/>
+          </p:nvPr>
+        </p:nvSpPr>
+        <p:spPr>
+          <a:xfrm>
+            <a:off x="381300" y="685800"/>
+            <a:ext cx="6096000" cy="3429000"/>
+          </a:xfrm>
+          <a:custGeom>
+            <a:rect b="b" l="l" r="r" t="t"/>
+            <a:pathLst>
+              <a:path extrusionOk="0" h="120000" w="120000">
+                <a:moveTo>
+                  <a:pt x="0" y="0"/>
+                </a:moveTo>
+                <a:lnTo>
+                  <a:pt x="120000" y="0"/>
+                </a:lnTo>
+                <a:lnTo>
+                  <a:pt x="120000" y="120000"/>
+                </a:lnTo>
+                <a:lnTo>
+                  <a:pt x="0" y="120000"/>
+                </a:lnTo>
+                <a:close/>
+              </a:path>
+            </a:pathLst>
+          </a:custGeom>
+        </p:spPr>
+      </p:sp>
+      <p:sp>
+        <p:nvSpPr>
+          <p:cNvPr id="152" name="Google Shape;152;g31ba41c4295_1_14:notes"/>
           <p:cNvSpPr txBox="1"/>
           <p:nvPr>
             <p:ph idx="1" type="body"/>
@@ -7336,6 +7736,218 @@
 </p:sld>
 </file>
 
+<file path=ppt/slides/slide15.xml><?xml version="1.0" encoding="utf-8"?>
+<p:sld xmlns:a="http://schemas.openxmlformats.org/drawingml/2006/main" xmlns:r="http://schemas.openxmlformats.org/officeDocument/2006/relationships" xmlns:mc="http://schemas.openxmlformats.org/markup-compatibility/2006" xmlns:mv="urn:schemas-microsoft-com:mac:vml" xmlns:p="http://schemas.openxmlformats.org/presentationml/2006/main" xmlns:c="http://schemas.openxmlformats.org/drawingml/2006/chart" xmlns:dgm="http://schemas.openxmlformats.org/drawingml/2006/diagram" xmlns:o="urn:schemas-microsoft-com:office:office" xmlns:v="urn:schemas-microsoft-com:vml" xmlns:pvml="urn:schemas-microsoft-com:office:powerpoint" xmlns:com="http://schemas.openxmlformats.org/drawingml/2006/compatibility" xmlns:p14="http://schemas.microsoft.com/office/powerpoint/2010/main" xmlns:p15="http://schemas.microsoft.com/office/powerpoint/2012/main" xmlns:ahyp="http://schemas.microsoft.com/office/drawing/2018/hyperlinkcolor">
+  <p:cSld>
+    <p:spTree>
+      <p:nvGrpSpPr>
+        <p:cNvPr id="138" name="Shape 138"/>
+        <p:cNvGrpSpPr/>
+        <p:nvPr/>
+      </p:nvGrpSpPr>
+      <p:grpSpPr>
+        <a:xfrm>
+          <a:off x="0" y="0"/>
+          <a:ext cx="0" cy="0"/>
+          <a:chOff x="0" y="0"/>
+          <a:chExt cx="0" cy="0"/>
+        </a:xfrm>
+      </p:grpSpPr>
+      <p:pic>
+        <p:nvPicPr>
+          <p:cNvPr id="139" name="Google Shape;139;p27"/>
+          <p:cNvPicPr preferRelativeResize="0"/>
+          <p:nvPr/>
+        </p:nvPicPr>
+        <p:blipFill>
+          <a:blip r:embed="rId3">
+            <a:alphaModFix/>
+          </a:blip>
+          <a:stretch>
+            <a:fillRect/>
+          </a:stretch>
+        </p:blipFill>
+        <p:spPr>
+          <a:xfrm>
+            <a:off x="152400" y="152400"/>
+            <a:ext cx="8839204" cy="3301753"/>
+          </a:xfrm>
+          <a:prstGeom prst="rect">
+            <a:avLst/>
+          </a:prstGeom>
+          <a:noFill/>
+          <a:ln>
+            <a:noFill/>
+          </a:ln>
+        </p:spPr>
+      </p:pic>
+    </p:spTree>
+  </p:cSld>
+  <p:clrMapOvr>
+    <a:masterClrMapping/>
+  </p:clrMapOvr>
+</p:sld>
+</file>
+
+<file path=ppt/slides/slide16.xml><?xml version="1.0" encoding="utf-8"?>
+<p:sld xmlns:a="http://schemas.openxmlformats.org/drawingml/2006/main" xmlns:r="http://schemas.openxmlformats.org/officeDocument/2006/relationships" xmlns:mc="http://schemas.openxmlformats.org/markup-compatibility/2006" xmlns:mv="urn:schemas-microsoft-com:mac:vml" xmlns:p="http://schemas.openxmlformats.org/presentationml/2006/main" xmlns:c="http://schemas.openxmlformats.org/drawingml/2006/chart" xmlns:dgm="http://schemas.openxmlformats.org/drawingml/2006/diagram" xmlns:o="urn:schemas-microsoft-com:office:office" xmlns:v="urn:schemas-microsoft-com:vml" xmlns:pvml="urn:schemas-microsoft-com:office:powerpoint" xmlns:com="http://schemas.openxmlformats.org/drawingml/2006/compatibility" xmlns:p14="http://schemas.microsoft.com/office/powerpoint/2010/main" xmlns:p15="http://schemas.microsoft.com/office/powerpoint/2012/main" xmlns:ahyp="http://schemas.microsoft.com/office/drawing/2018/hyperlinkcolor">
+  <p:cSld>
+    <p:spTree>
+      <p:nvGrpSpPr>
+        <p:cNvPr id="143" name="Shape 143"/>
+        <p:cNvGrpSpPr/>
+        <p:nvPr/>
+      </p:nvGrpSpPr>
+      <p:grpSpPr>
+        <a:xfrm>
+          <a:off x="0" y="0"/>
+          <a:ext cx="0" cy="0"/>
+          <a:chOff x="0" y="0"/>
+          <a:chExt cx="0" cy="0"/>
+        </a:xfrm>
+      </p:grpSpPr>
+      <p:pic>
+        <p:nvPicPr>
+          <p:cNvPr id="144" name="Google Shape;144;p28"/>
+          <p:cNvPicPr preferRelativeResize="0"/>
+          <p:nvPr/>
+        </p:nvPicPr>
+        <p:blipFill>
+          <a:blip r:embed="rId3">
+            <a:alphaModFix/>
+          </a:blip>
+          <a:stretch>
+            <a:fillRect/>
+          </a:stretch>
+        </p:blipFill>
+        <p:spPr>
+          <a:xfrm>
+            <a:off x="152400" y="152400"/>
+            <a:ext cx="8183040" cy="4838702"/>
+          </a:xfrm>
+          <a:prstGeom prst="rect">
+            <a:avLst/>
+          </a:prstGeom>
+          <a:noFill/>
+          <a:ln>
+            <a:noFill/>
+          </a:ln>
+        </p:spPr>
+      </p:pic>
+    </p:spTree>
+  </p:cSld>
+  <p:clrMapOvr>
+    <a:masterClrMapping/>
+  </p:clrMapOvr>
+</p:sld>
+</file>
+
+<file path=ppt/slides/slide17.xml><?xml version="1.0" encoding="utf-8"?>
+<p:sld xmlns:a="http://schemas.openxmlformats.org/drawingml/2006/main" xmlns:r="http://schemas.openxmlformats.org/officeDocument/2006/relationships" xmlns:mc="http://schemas.openxmlformats.org/markup-compatibility/2006" xmlns:mv="urn:schemas-microsoft-com:mac:vml" xmlns:p="http://schemas.openxmlformats.org/presentationml/2006/main" xmlns:c="http://schemas.openxmlformats.org/drawingml/2006/chart" xmlns:dgm="http://schemas.openxmlformats.org/drawingml/2006/diagram" xmlns:o="urn:schemas-microsoft-com:office:office" xmlns:v="urn:schemas-microsoft-com:vml" xmlns:pvml="urn:schemas-microsoft-com:office:powerpoint" xmlns:com="http://schemas.openxmlformats.org/drawingml/2006/compatibility" xmlns:p14="http://schemas.microsoft.com/office/powerpoint/2010/main" xmlns:p15="http://schemas.microsoft.com/office/powerpoint/2012/main" xmlns:ahyp="http://schemas.microsoft.com/office/drawing/2018/hyperlinkcolor">
+  <p:cSld>
+    <p:spTree>
+      <p:nvGrpSpPr>
+        <p:cNvPr id="148" name="Shape 148"/>
+        <p:cNvGrpSpPr/>
+        <p:nvPr/>
+      </p:nvGrpSpPr>
+      <p:grpSpPr>
+        <a:xfrm>
+          <a:off x="0" y="0"/>
+          <a:ext cx="0" cy="0"/>
+          <a:chOff x="0" y="0"/>
+          <a:chExt cx="0" cy="0"/>
+        </a:xfrm>
+      </p:grpSpPr>
+      <p:pic>
+        <p:nvPicPr>
+          <p:cNvPr id="149" name="Google Shape;149;p29"/>
+          <p:cNvPicPr preferRelativeResize="0"/>
+          <p:nvPr/>
+        </p:nvPicPr>
+        <p:blipFill>
+          <a:blip r:embed="rId3">
+            <a:alphaModFix/>
+          </a:blip>
+          <a:stretch>
+            <a:fillRect/>
+          </a:stretch>
+        </p:blipFill>
+        <p:spPr>
+          <a:xfrm>
+            <a:off x="152400" y="152400"/>
+            <a:ext cx="8839204" cy="4307385"/>
+          </a:xfrm>
+          <a:prstGeom prst="rect">
+            <a:avLst/>
+          </a:prstGeom>
+          <a:noFill/>
+          <a:ln>
+            <a:noFill/>
+          </a:ln>
+        </p:spPr>
+      </p:pic>
+    </p:spTree>
+  </p:cSld>
+  <p:clrMapOvr>
+    <a:masterClrMapping/>
+  </p:clrMapOvr>
+</p:sld>
+</file>
+
+<file path=ppt/slides/slide18.xml><?xml version="1.0" encoding="utf-8"?>
+<p:sld xmlns:a="http://schemas.openxmlformats.org/drawingml/2006/main" xmlns:r="http://schemas.openxmlformats.org/officeDocument/2006/relationships" xmlns:mc="http://schemas.openxmlformats.org/markup-compatibility/2006" xmlns:mv="urn:schemas-microsoft-com:mac:vml" xmlns:p="http://schemas.openxmlformats.org/presentationml/2006/main" xmlns:c="http://schemas.openxmlformats.org/drawingml/2006/chart" xmlns:dgm="http://schemas.openxmlformats.org/drawingml/2006/diagram" xmlns:o="urn:schemas-microsoft-com:office:office" xmlns:v="urn:schemas-microsoft-com:vml" xmlns:pvml="urn:schemas-microsoft-com:office:powerpoint" xmlns:com="http://schemas.openxmlformats.org/drawingml/2006/compatibility" xmlns:p14="http://schemas.microsoft.com/office/powerpoint/2010/main" xmlns:p15="http://schemas.microsoft.com/office/powerpoint/2012/main" xmlns:ahyp="http://schemas.microsoft.com/office/drawing/2018/hyperlinkcolor">
+  <p:cSld>
+    <p:spTree>
+      <p:nvGrpSpPr>
+        <p:cNvPr id="153" name="Shape 153"/>
+        <p:cNvGrpSpPr/>
+        <p:nvPr/>
+      </p:nvGrpSpPr>
+      <p:grpSpPr>
+        <a:xfrm>
+          <a:off x="0" y="0"/>
+          <a:ext cx="0" cy="0"/>
+          <a:chOff x="0" y="0"/>
+          <a:chExt cx="0" cy="0"/>
+        </a:xfrm>
+      </p:grpSpPr>
+      <p:pic>
+        <p:nvPicPr>
+          <p:cNvPr id="154" name="Google Shape;154;p30"/>
+          <p:cNvPicPr preferRelativeResize="0"/>
+          <p:nvPr/>
+        </p:nvPicPr>
+        <p:blipFill>
+          <a:blip r:embed="rId3">
+            <a:alphaModFix/>
+          </a:blip>
+          <a:stretch>
+            <a:fillRect/>
+          </a:stretch>
+        </p:blipFill>
+        <p:spPr>
+          <a:xfrm>
+            <a:off x="152400" y="152400"/>
+            <a:ext cx="8839204" cy="2464446"/>
+          </a:xfrm>
+          <a:prstGeom prst="rect">
+            <a:avLst/>
+          </a:prstGeom>
+          <a:noFill/>
+          <a:ln>
+            <a:noFill/>
+          </a:ln>
+        </p:spPr>
+      </p:pic>
+    </p:spTree>
+  </p:cSld>
+  <p:clrMapOvr>
+    <a:masterClrMapping/>
+  </p:clrMapOvr>
+</p:sld>
+</file>
+
 <file path=ppt/slides/slide2.xml><?xml version="1.0" encoding="utf-8"?>
 <p:sld xmlns:a="http://schemas.openxmlformats.org/drawingml/2006/main" xmlns:r="http://schemas.openxmlformats.org/officeDocument/2006/relationships" xmlns:mc="http://schemas.openxmlformats.org/markup-compatibility/2006" xmlns:mv="urn:schemas-microsoft-com:mac:vml" xmlns:p="http://schemas.openxmlformats.org/presentationml/2006/main" xmlns:c="http://schemas.openxmlformats.org/drawingml/2006/chart" xmlns:dgm="http://schemas.openxmlformats.org/drawingml/2006/diagram" xmlns:o="urn:schemas-microsoft-com:office:office" xmlns:v="urn:schemas-microsoft-com:vml" xmlns:pvml="urn:schemas-microsoft-com:office:powerpoint" xmlns:com="http://schemas.openxmlformats.org/drawingml/2006/compatibility" xmlns:p14="http://schemas.microsoft.com/office/powerpoint/2010/main" xmlns:p15="http://schemas.microsoft.com/office/powerpoint/2012/main" xmlns:ahyp="http://schemas.microsoft.com/office/drawing/2018/hyperlinkcolor">
   <p:cSld>

</xml_diff>